<commit_message>
Commit para segunda e terceira aula;
</commit_message>
<xml_diff>
--- a/Aula01.pptx
+++ b/Aula01.pptx
@@ -239,7 +239,7 @@
             <a:fld id="{4FC57188-328F-409D-ABFB-91E1B6C5CBEE}" type="datetimeFigureOut">
               <a:rPr lang="pt-BR" smtClean="0"/>
               <a:pPr/>
-              <a:t>23/03/2018</a:t>
+              <a:t>24/03/2018</a:t>
             </a:fld>
             <a:endParaRPr lang="pt-BR"/>
           </a:p>
@@ -767,7 +767,7 @@
             <a:fld id="{C1D1DBAD-5489-4EDB-8C36-EEBBA31CE2AB}" type="datetime1">
               <a:rPr lang="pt-BR" smtClean="0"/>
               <a:pPr/>
-              <a:t>23/03/2018</a:t>
+              <a:t>24/03/2018</a:t>
             </a:fld>
             <a:endParaRPr lang="pt-BR"/>
           </a:p>
@@ -934,7 +934,7 @@
             <a:fld id="{0648C560-E8F5-4568-98A8-F600B0D8A4F0}" type="datetime1">
               <a:rPr lang="pt-BR" smtClean="0"/>
               <a:pPr/>
-              <a:t>23/03/2018</a:t>
+              <a:t>24/03/2018</a:t>
             </a:fld>
             <a:endParaRPr lang="pt-BR"/>
           </a:p>
@@ -1111,7 +1111,7 @@
             <a:fld id="{A261A9BA-C3FF-4FA8-B5C7-51100E834B63}" type="datetime1">
               <a:rPr lang="pt-BR" smtClean="0"/>
               <a:pPr/>
-              <a:t>23/03/2018</a:t>
+              <a:t>24/03/2018</a:t>
             </a:fld>
             <a:endParaRPr lang="pt-BR"/>
           </a:p>
@@ -1278,7 +1278,7 @@
             <a:fld id="{20F63199-19BE-4345-8186-3FE6ABEF2D1B}" type="datetime1">
               <a:rPr lang="pt-BR" smtClean="0"/>
               <a:pPr/>
-              <a:t>23/03/2018</a:t>
+              <a:t>24/03/2018</a:t>
             </a:fld>
             <a:endParaRPr lang="pt-BR"/>
           </a:p>
@@ -1529,7 +1529,7 @@
             <a:fld id="{6267C653-65CA-451C-AA6B-70D341279164}" type="datetime1">
               <a:rPr lang="pt-BR" smtClean="0"/>
               <a:pPr/>
-              <a:t>23/03/2018</a:t>
+              <a:t>24/03/2018</a:t>
             </a:fld>
             <a:endParaRPr lang="pt-BR"/>
           </a:p>
@@ -1795,7 +1795,7 @@
             <a:fld id="{9F4FDE23-7AD0-441F-B625-D091A50DCADC}" type="datetime1">
               <a:rPr lang="pt-BR" smtClean="0"/>
               <a:pPr/>
-              <a:t>23/03/2018</a:t>
+              <a:t>24/03/2018</a:t>
             </a:fld>
             <a:endParaRPr lang="pt-BR"/>
           </a:p>
@@ -2175,7 +2175,7 @@
             <a:fld id="{CB13160C-8BAD-40DB-9688-531D9DF7DCD3}" type="datetime1">
               <a:rPr lang="pt-BR" smtClean="0"/>
               <a:pPr/>
-              <a:t>23/03/2018</a:t>
+              <a:t>24/03/2018</a:t>
             </a:fld>
             <a:endParaRPr lang="pt-BR"/>
           </a:p>
@@ -2327,7 +2327,7 @@
             <a:fld id="{26C0299F-E4FE-4103-85D5-56468E3D35D4}" type="datetime1">
               <a:rPr lang="pt-BR" smtClean="0"/>
               <a:pPr/>
-              <a:t>23/03/2018</a:t>
+              <a:t>24/03/2018</a:t>
             </a:fld>
             <a:endParaRPr lang="pt-BR"/>
           </a:p>
@@ -2419,7 +2419,7 @@
             <a:fld id="{655C7A29-7872-454C-8B8E-A38679A91596}" type="datetime1">
               <a:rPr lang="pt-BR" smtClean="0"/>
               <a:pPr/>
-              <a:t>23/03/2018</a:t>
+              <a:t>24/03/2018</a:t>
             </a:fld>
             <a:endParaRPr lang="pt-BR"/>
           </a:p>
@@ -2682,7 +2682,7 @@
             <a:fld id="{776E30D2-4101-44C7-B6AE-43D92E248AD0}" type="datetime1">
               <a:rPr lang="pt-BR" smtClean="0"/>
               <a:pPr/>
-              <a:t>23/03/2018</a:t>
+              <a:t>24/03/2018</a:t>
             </a:fld>
             <a:endParaRPr lang="pt-BR"/>
           </a:p>
@@ -2972,7 +2972,7 @@
             <a:fld id="{A9B7A1D8-8FEA-4761-ADA2-5B7EC3F0A03C}" type="datetime1">
               <a:rPr lang="pt-BR" smtClean="0"/>
               <a:pPr/>
-              <a:t>23/03/2018</a:t>
+              <a:t>24/03/2018</a:t>
             </a:fld>
             <a:endParaRPr lang="pt-BR"/>
           </a:p>
@@ -3745,7 +3745,7 @@
             <a:fld id="{D9F0E698-E276-4BE3-A092-15CA1BEF6177}" type="datetime1">
               <a:rPr lang="pt-BR" smtClean="0"/>
               <a:pPr/>
-              <a:t>23/03/2018</a:t>
+              <a:t>24/03/2018</a:t>
             </a:fld>
             <a:endParaRPr lang="pt-BR"/>
           </a:p>
@@ -4450,11 +4450,18 @@
           </a:p>
           <a:p>
             <a:r>
-              <a:rPr lang="pt-BR" sz="3400" dirty="0" smtClean="0"/>
+              <a:rPr lang="pt-BR" sz="3400" dirty="0" smtClean="0">
+                <a:hlinkClick r:id="rId2"/>
+              </a:rPr>
               <a:t>leonardopordeus@gmail.com</a:t>
             </a:r>
-          </a:p>
-          <a:p>
+            <a:endParaRPr lang="pt-BR" sz="3400" dirty="0" smtClean="0"/>
+          </a:p>
+          <a:p>
+            <a:r>
+              <a:rPr lang="pt-BR" sz="3400" dirty="0"/>
+              <a:t>https://github.com/leonardopordeus/android</a:t>
+            </a:r>
             <a:endParaRPr lang="pt-BR" sz="3400" dirty="0" smtClean="0"/>
           </a:p>
           <a:p>
@@ -4490,7 +4497,7 @@
           <p:nvPr/>
         </p:nvPicPr>
         <p:blipFill>
-          <a:blip r:embed="rId2">
+          <a:blip r:embed="rId3">
             <a:extLst>
               <a:ext uri="{28A0092B-C50C-407E-A947-70E740481C1C}">
                 <a14:useLocalDpi xmlns:a14="http://schemas.microsoft.com/office/drawing/2010/main" val="0"/>
@@ -7144,6 +7151,13 @@
   <p:clrMapOvr>
     <a:masterClrMapping/>
   </p:clrMapOvr>
+  <p:timing>
+    <p:tnLst>
+      <p:par>
+        <p:cTn id="1" dur="indefinite" restart="never" nodeType="tmRoot"/>
+      </p:par>
+    </p:tnLst>
+  </p:timing>
 </p:sld>
 </file>
 

</xml_diff>